<commit_message>
chg: Correcting tgt name from OPARTGT to SYTGT in target folders
</commit_message>
<xml_diff>
--- a/UNDER DEVELOPMENT/OPAR Version 2/JESTER/SYTGT002_Syrian_Army_HQ_building2.pptx
+++ b/UNDER DEVELOPMENT/OPAR Version 2/JESTER/SYTGT002_Syrian_Army_HQ_building2.pptx
@@ -110,7 +110,7 @@
   </p:defaultTextStyle>
   <p:extLst>
     <p:ext uri="{EFAFB233-063F-42B5-8137-9DF3F51BA10A}">
-      <p15:sldGuideLst xmlns:p15="http://schemas.microsoft.com/office/powerpoint/2012/main">
+      <p15:sldGuideLst xmlns:p15="http://schemas.microsoft.com/office/powerpoint/2012/main" xmlns="">
         <p15:guide id="1" orient="horz" pos="1620">
           <p15:clr>
             <a:srgbClr val="A4A3A4"/>
@@ -210,7 +210,7 @@
             <a:fld id="{40637A30-8EE1-4060-9976-8832FC89EE34}" type="datetimeFigureOut">
               <a:rPr lang="nb-NO" smtClean="0"/>
               <a:pPr/>
-              <a:t>02.01.2022</a:t>
+              <a:t>09.06.2022</a:t>
             </a:fld>
             <a:endParaRPr lang="nb-NO"/>
           </a:p>
@@ -4635,7 +4635,7 @@
           <p:cNvPr id="64" name="Afbeelding 63">
             <a:extLst>
               <a:ext uri="{FF2B5EF4-FFF2-40B4-BE49-F238E27FC236}">
-                <a16:creationId xmlns:a16="http://schemas.microsoft.com/office/drawing/2014/main" id="{854524F3-C858-48C7-82CE-2EA3D582A097}"/>
+                <a16:creationId xmlns:a16="http://schemas.microsoft.com/office/drawing/2014/main" xmlns="" id="{854524F3-C858-48C7-82CE-2EA3D582A097}"/>
               </a:ext>
             </a:extLst>
           </p:cNvPr>
@@ -4645,10 +4645,10 @@
           <p:nvPr/>
         </p:nvPicPr>
         <p:blipFill>
-          <a:blip r:embed="rId2">
+          <a:blip r:embed="rId2" cstate="print">
             <a:extLst>
               <a:ext uri="{BEBA8EAE-BF5A-486C-A8C5-ECC9F3942E4B}">
-                <a14:imgProps xmlns:a14="http://schemas.microsoft.com/office/drawing/2010/main">
+                <a14:imgProps xmlns:a14="http://schemas.microsoft.com/office/drawing/2010/main" xmlns="">
                   <a14:imgLayer r:embed="rId3">
                     <a14:imgEffect>
                       <a14:artisticFilmGrain/>
@@ -4767,7 +4767,7 @@
           <p:cNvPr id="57" name="Picture 2" descr="C:\Users\HARDC\Saved Games\DCS.openbeta\ScreenShots\Screen_200824_212755.png">
             <a:extLst>
               <a:ext uri="{FF2B5EF4-FFF2-40B4-BE49-F238E27FC236}">
-                <a16:creationId xmlns:a16="http://schemas.microsoft.com/office/drawing/2014/main" id="{00EE4CA1-3751-4688-AA6F-2F0555697605}"/>
+                <a16:creationId xmlns:a16="http://schemas.microsoft.com/office/drawing/2014/main" xmlns="" id="{00EE4CA1-3751-4688-AA6F-2F0555697605}"/>
               </a:ext>
             </a:extLst>
           </p:cNvPr>
@@ -4895,7 +4895,7 @@
           <p:cNvPr id="70" name="Vrije vorm: vorm 69">
             <a:extLst>
               <a:ext uri="{FF2B5EF4-FFF2-40B4-BE49-F238E27FC236}">
-                <a16:creationId xmlns:a16="http://schemas.microsoft.com/office/drawing/2014/main" id="{3E942A1C-4F1E-4AC5-B1B5-BA2BFDE6CA8C}"/>
+                <a16:creationId xmlns:a16="http://schemas.microsoft.com/office/drawing/2014/main" xmlns="" id="{3E942A1C-4F1E-4AC5-B1B5-BA2BFDE6CA8C}"/>
               </a:ext>
             </a:extLst>
           </p:cNvPr>
@@ -4994,7 +4994,7 @@
           <p:cNvPr id="74" name="Rechte verbindingslijn met pijl 73">
             <a:extLst>
               <a:ext uri="{FF2B5EF4-FFF2-40B4-BE49-F238E27FC236}">
-                <a16:creationId xmlns:a16="http://schemas.microsoft.com/office/drawing/2014/main" id="{2BD538BC-1911-4239-B608-5D4E37CDCFCF}"/>
+                <a16:creationId xmlns:a16="http://schemas.microsoft.com/office/drawing/2014/main" xmlns="" id="{2BD538BC-1911-4239-B608-5D4E37CDCFCF}"/>
               </a:ext>
             </a:extLst>
           </p:cNvPr>
@@ -5038,7 +5038,7 @@
           <p:cNvPr id="78" name="Tekstvak 77">
             <a:extLst>
               <a:ext uri="{FF2B5EF4-FFF2-40B4-BE49-F238E27FC236}">
-                <a16:creationId xmlns:a16="http://schemas.microsoft.com/office/drawing/2014/main" id="{1C8393C2-10F9-410D-A10E-DB0BAD524DD3}"/>
+                <a16:creationId xmlns:a16="http://schemas.microsoft.com/office/drawing/2014/main" xmlns="" id="{1C8393C2-10F9-410D-A10E-DB0BAD524DD3}"/>
               </a:ext>
             </a:extLst>
           </p:cNvPr>
@@ -5080,7 +5080,7 @@
           <p:cNvPr id="33" name="Freeform: Shape 32">
             <a:extLst>
               <a:ext uri="{FF2B5EF4-FFF2-40B4-BE49-F238E27FC236}">
-                <a16:creationId xmlns:a16="http://schemas.microsoft.com/office/drawing/2014/main" id="{3110A3BE-F305-42C1-8432-082CDFEE58E2}"/>
+                <a16:creationId xmlns:a16="http://schemas.microsoft.com/office/drawing/2014/main" xmlns="" id="{3110A3BE-F305-42C1-8432-082CDFEE58E2}"/>
               </a:ext>
             </a:extLst>
           </p:cNvPr>
@@ -5183,7 +5183,7 @@
           <p:cNvPr id="44" name="Group 43">
             <a:extLst>
               <a:ext uri="{FF2B5EF4-FFF2-40B4-BE49-F238E27FC236}">
-                <a16:creationId xmlns:a16="http://schemas.microsoft.com/office/drawing/2014/main" id="{DC0745A1-DCE8-4758-B4EB-33F19854D3C2}"/>
+                <a16:creationId xmlns:a16="http://schemas.microsoft.com/office/drawing/2014/main" xmlns="" id="{DC0745A1-DCE8-4758-B4EB-33F19854D3C2}"/>
               </a:ext>
             </a:extLst>
           </p:cNvPr>
@@ -5203,7 +5203,7 @@
             <p:cNvPr id="45" name="TekstSylinder 9">
               <a:extLst>
                 <a:ext uri="{FF2B5EF4-FFF2-40B4-BE49-F238E27FC236}">
-                  <a16:creationId xmlns:a16="http://schemas.microsoft.com/office/drawing/2014/main" id="{9534F23E-449D-4ABA-BE81-A5483E163193}"/>
+                  <a16:creationId xmlns:a16="http://schemas.microsoft.com/office/drawing/2014/main" xmlns="" id="{9534F23E-449D-4ABA-BE81-A5483E163193}"/>
                 </a:ext>
               </a:extLst>
             </p:cNvPr>
@@ -5244,7 +5244,7 @@
             <p:cNvPr id="47" name="Isosceles Triangle 46">
               <a:extLst>
                 <a:ext uri="{FF2B5EF4-FFF2-40B4-BE49-F238E27FC236}">
-                  <a16:creationId xmlns:a16="http://schemas.microsoft.com/office/drawing/2014/main" id="{FEE09687-94B0-4C79-B0E6-09511982535B}"/>
+                  <a16:creationId xmlns:a16="http://schemas.microsoft.com/office/drawing/2014/main" xmlns="" id="{FEE09687-94B0-4C79-B0E6-09511982535B}"/>
                 </a:ext>
               </a:extLst>
             </p:cNvPr>
@@ -6257,7 +6257,7 @@
           <p:cNvPr id="39" name="Afbeelding 38">
             <a:extLst>
               <a:ext uri="{FF2B5EF4-FFF2-40B4-BE49-F238E27FC236}">
-                <a16:creationId xmlns:a16="http://schemas.microsoft.com/office/drawing/2014/main" id="{06015943-4D5D-4619-8D50-00B20E29703B}"/>
+                <a16:creationId xmlns:a16="http://schemas.microsoft.com/office/drawing/2014/main" xmlns="" id="{06015943-4D5D-4619-8D50-00B20E29703B}"/>
               </a:ext>
             </a:extLst>
           </p:cNvPr>
@@ -6267,7 +6267,7 @@
           <p:nvPr/>
         </p:nvPicPr>
         <p:blipFill>
-          <a:blip r:embed="rId2"/>
+          <a:blip r:embed="rId2" cstate="print"/>
           <a:stretch>
             <a:fillRect/>
           </a:stretch>
@@ -6287,7 +6287,7 @@
           <p:cNvPr id="32" name="Pijl: omlaag 31">
             <a:extLst>
               <a:ext uri="{FF2B5EF4-FFF2-40B4-BE49-F238E27FC236}">
-                <a16:creationId xmlns:a16="http://schemas.microsoft.com/office/drawing/2014/main" id="{5308D0B8-16D4-4AE5-BE6B-C5CA2114EC8C}"/>
+                <a16:creationId xmlns:a16="http://schemas.microsoft.com/office/drawing/2014/main" xmlns="" id="{5308D0B8-16D4-4AE5-BE6B-C5CA2114EC8C}"/>
               </a:ext>
             </a:extLst>
           </p:cNvPr>
@@ -6341,7 +6341,7 @@
           <p:cNvPr id="33" name="Tekstvak 32">
             <a:extLst>
               <a:ext uri="{FF2B5EF4-FFF2-40B4-BE49-F238E27FC236}">
-                <a16:creationId xmlns:a16="http://schemas.microsoft.com/office/drawing/2014/main" id="{34FE50AD-0D4E-451E-A3B0-57023846D663}"/>
+                <a16:creationId xmlns:a16="http://schemas.microsoft.com/office/drawing/2014/main" xmlns="" id="{34FE50AD-0D4E-451E-A3B0-57023846D663}"/>
               </a:ext>
             </a:extLst>
           </p:cNvPr>
@@ -6380,7 +6380,7 @@
           <p:cNvPr id="35" name="Pil opp 2">
             <a:extLst>
               <a:ext uri="{FF2B5EF4-FFF2-40B4-BE49-F238E27FC236}">
-                <a16:creationId xmlns:a16="http://schemas.microsoft.com/office/drawing/2014/main" id="{E1463FA9-EC92-4707-90A2-FB5D443ECC8F}"/>
+                <a16:creationId xmlns:a16="http://schemas.microsoft.com/office/drawing/2014/main" xmlns="" id="{E1463FA9-EC92-4707-90A2-FB5D443ECC8F}"/>
               </a:ext>
             </a:extLst>
           </p:cNvPr>
@@ -6435,7 +6435,7 @@
           <p:cNvPr id="30" name="Freeform: Shape 29">
             <a:extLst>
               <a:ext uri="{FF2B5EF4-FFF2-40B4-BE49-F238E27FC236}">
-                <a16:creationId xmlns:a16="http://schemas.microsoft.com/office/drawing/2014/main" id="{E45F73AE-E164-4C37-A27A-F1183366EEE2}"/>
+                <a16:creationId xmlns:a16="http://schemas.microsoft.com/office/drawing/2014/main" xmlns="" id="{E45F73AE-E164-4C37-A27A-F1183366EEE2}"/>
               </a:ext>
             </a:extLst>
           </p:cNvPr>

</xml_diff>